<commit_message>
Updated PPT with more details on descriptors
Plots and update GIF added
</commit_message>
<xml_diff>
--- a/Video Clustering using image descriptors.pptx
+++ b/Video Clustering using image descriptors.pptx
@@ -5,19 +5,21 @@
     <p:sldMasterId id="2147483658" r:id="rId4"/>
   </p:sldMasterIdLst>
   <p:notesMasterIdLst>
-    <p:notesMasterId r:id="rId15"/>
+    <p:notesMasterId r:id="rId17"/>
   </p:notesMasterIdLst>
   <p:sldIdLst>
     <p:sldId id="316" r:id="rId5"/>
     <p:sldId id="310" r:id="rId6"/>
     <p:sldId id="320" r:id="rId7"/>
     <p:sldId id="311" r:id="rId8"/>
-    <p:sldId id="318" r:id="rId9"/>
-    <p:sldId id="319" r:id="rId10"/>
-    <p:sldId id="312" r:id="rId11"/>
-    <p:sldId id="321" r:id="rId12"/>
-    <p:sldId id="322" r:id="rId13"/>
-    <p:sldId id="308" r:id="rId14"/>
+    <p:sldId id="323" r:id="rId9"/>
+    <p:sldId id="318" r:id="rId10"/>
+    <p:sldId id="319" r:id="rId11"/>
+    <p:sldId id="312" r:id="rId12"/>
+    <p:sldId id="324" r:id="rId13"/>
+    <p:sldId id="321" r:id="rId14"/>
+    <p:sldId id="322" r:id="rId15"/>
+    <p:sldId id="308" r:id="rId16"/>
   </p:sldIdLst>
   <p:sldSz cx="12192000" cy="6858000"/>
   <p:notesSz cx="6858000" cy="9144000"/>
@@ -128,8 +130,8 @@
 <pc:chgInfo xmlns:a="http://schemas.openxmlformats.org/drawingml/2006/main" xmlns:r="http://schemas.openxmlformats.org/officeDocument/2006/relationships" xmlns:ac="http://schemas.microsoft.com/office/drawing/2013/main/command" xmlns:pc="http://schemas.microsoft.com/office/powerpoint/2013/main/command">
   <pc:docChgLst>
     <pc:chgData name="wajih ullah baig" userId="909666cdfb56e88f" providerId="LiveId" clId="{40840062-6581-4FCE-A77C-8B7FEB783C39}"/>
-    <pc:docChg chg="undo custSel addSld delSld modSld">
-      <pc:chgData name="wajih ullah baig" userId="909666cdfb56e88f" providerId="LiveId" clId="{40840062-6581-4FCE-A77C-8B7FEB783C39}" dt="2024-07-24T06:21:53.709" v="966" actId="20577"/>
+    <pc:docChg chg="undo custSel addSld delSld modSld sldOrd">
+      <pc:chgData name="wajih ullah baig" userId="909666cdfb56e88f" providerId="LiveId" clId="{40840062-6581-4FCE-A77C-8B7FEB783C39}" dt="2024-07-25T07:28:45.527" v="1640" actId="14100"/>
       <pc:docMkLst>
         <pc:docMk/>
       </pc:docMkLst>
@@ -169,7 +171,7 @@
         </pc:sldMkLst>
       </pc:sldChg>
       <pc:sldChg chg="addSp delSp modSp mod">
-        <pc:chgData name="wajih ullah baig" userId="909666cdfb56e88f" providerId="LiveId" clId="{40840062-6581-4FCE-A77C-8B7FEB783C39}" dt="2024-07-24T05:56:27.992" v="886" actId="20577"/>
+        <pc:chgData name="wajih ullah baig" userId="909666cdfb56e88f" providerId="LiveId" clId="{40840062-6581-4FCE-A77C-8B7FEB783C39}" dt="2024-07-25T07:28:45.527" v="1640" actId="14100"/>
         <pc:sldMkLst>
           <pc:docMk/>
           <pc:sldMk cId="987283912" sldId="308"/>
@@ -215,7 +217,7 @@
           </ac:spMkLst>
         </pc:spChg>
         <pc:spChg chg="mod">
-          <ac:chgData name="wajih ullah baig" userId="909666cdfb56e88f" providerId="LiveId" clId="{40840062-6581-4FCE-A77C-8B7FEB783C39}" dt="2024-07-24T04:48:55.696" v="762" actId="20577"/>
+          <ac:chgData name="wajih ullah baig" userId="909666cdfb56e88f" providerId="LiveId" clId="{40840062-6581-4FCE-A77C-8B7FEB783C39}" dt="2024-07-25T07:28:45.527" v="1640" actId="14100"/>
           <ac:spMkLst>
             <pc:docMk/>
             <pc:sldMk cId="987283912" sldId="308"/>
@@ -248,7 +250,7 @@
         </pc:picChg>
       </pc:sldChg>
       <pc:sldChg chg="addSp delSp modSp mod">
-        <pc:chgData name="wajih ullah baig" userId="909666cdfb56e88f" providerId="LiveId" clId="{40840062-6581-4FCE-A77C-8B7FEB783C39}" dt="2024-07-24T06:19:58.004" v="951" actId="14100"/>
+        <pc:chgData name="wajih ullah baig" userId="909666cdfb56e88f" providerId="LiveId" clId="{40840062-6581-4FCE-A77C-8B7FEB783C39}" dt="2024-07-25T06:07:09.300" v="1021" actId="5793"/>
         <pc:sldMkLst>
           <pc:docMk/>
           <pc:sldMk cId="170988662" sldId="310"/>
@@ -267,6 +269,14 @@
             <pc:docMk/>
             <pc:sldMk cId="170988662" sldId="310"/>
             <ac:spMk id="3" creationId="{8FA222E3-EF0C-4EAB-9068-4D5E7574C8DA}"/>
+          </ac:spMkLst>
+        </pc:spChg>
+        <pc:spChg chg="mod">
+          <ac:chgData name="wajih ullah baig" userId="909666cdfb56e88f" providerId="LiveId" clId="{40840062-6581-4FCE-A77C-8B7FEB783C39}" dt="2024-07-25T06:07:09.300" v="1021" actId="5793"/>
+          <ac:spMkLst>
+            <pc:docMk/>
+            <pc:sldMk cId="170988662" sldId="310"/>
+            <ac:spMk id="5" creationId="{F01866DD-53C9-4AF0-9E9A-BF19D245E8C6}"/>
           </ac:spMkLst>
         </pc:spChg>
         <pc:spChg chg="add del mod">
@@ -357,6 +367,21 @@
             <ac:picMk id="1038" creationId="{D7998689-E533-4777-BB01-E93F6F033554}"/>
           </ac:picMkLst>
         </pc:picChg>
+      </pc:sldChg>
+      <pc:sldChg chg="modSp mod">
+        <pc:chgData name="wajih ullah baig" userId="909666cdfb56e88f" providerId="LiveId" clId="{40840062-6581-4FCE-A77C-8B7FEB783C39}" dt="2024-07-25T06:06:40.367" v="1013" actId="20577"/>
+        <pc:sldMkLst>
+          <pc:docMk/>
+          <pc:sldMk cId="1087605110" sldId="311"/>
+        </pc:sldMkLst>
+        <pc:spChg chg="mod">
+          <ac:chgData name="wajih ullah baig" userId="909666cdfb56e88f" providerId="LiveId" clId="{40840062-6581-4FCE-A77C-8B7FEB783C39}" dt="2024-07-25T06:06:40.367" v="1013" actId="20577"/>
+          <ac:spMkLst>
+            <pc:docMk/>
+            <pc:sldMk cId="1087605110" sldId="311"/>
+            <ac:spMk id="3" creationId="{065994E4-45F6-40E9-98B7-10B9F6F0503C}"/>
+          </ac:spMkLst>
+        </pc:spChg>
       </pc:sldChg>
       <pc:sldChg chg="modSp mod">
         <pc:chgData name="wajih ullah baig" userId="909666cdfb56e88f" providerId="LiveId" clId="{40840062-6581-4FCE-A77C-8B7FEB783C39}" dt="2024-07-24T04:45:23.742" v="279" actId="20577"/>
@@ -497,7 +522,7 @@
         </pc:picChg>
       </pc:sldChg>
       <pc:sldChg chg="addSp delSp modSp new mod">
-        <pc:chgData name="wajih ullah baig" userId="909666cdfb56e88f" providerId="LiveId" clId="{40840062-6581-4FCE-A77C-8B7FEB783C39}" dt="2024-07-24T04:51:57.942" v="779" actId="14100"/>
+        <pc:chgData name="wajih ullah baig" userId="909666cdfb56e88f" providerId="LiveId" clId="{40840062-6581-4FCE-A77C-8B7FEB783C39}" dt="2024-07-25T07:23:26.967" v="1260" actId="14100"/>
         <pc:sldMkLst>
           <pc:docMk/>
           <pc:sldMk cId="3956849390" sldId="321"/>
@@ -535,7 +560,23 @@
           </ac:spMkLst>
         </pc:spChg>
         <pc:picChg chg="add mod">
-          <ac:chgData name="wajih ullah baig" userId="909666cdfb56e88f" providerId="LiveId" clId="{40840062-6581-4FCE-A77C-8B7FEB783C39}" dt="2024-07-24T04:51:45.393" v="776" actId="1076"/>
+          <ac:chgData name="wajih ullah baig" userId="909666cdfb56e88f" providerId="LiveId" clId="{40840062-6581-4FCE-A77C-8B7FEB783C39}" dt="2024-07-25T07:23:13.787" v="1257" actId="1076"/>
+          <ac:picMkLst>
+            <pc:docMk/>
+            <pc:sldMk cId="3956849390" sldId="321"/>
+            <ac:picMk id="3" creationId="{3D32B62A-FCD7-4B7F-82A4-34D02887E12B}"/>
+          </ac:picMkLst>
+        </pc:picChg>
+        <pc:picChg chg="add mod">
+          <ac:chgData name="wajih ullah baig" userId="909666cdfb56e88f" providerId="LiveId" clId="{40840062-6581-4FCE-A77C-8B7FEB783C39}" dt="2024-07-25T07:23:26.967" v="1260" actId="14100"/>
+          <ac:picMkLst>
+            <pc:docMk/>
+            <pc:sldMk cId="3956849390" sldId="321"/>
+            <ac:picMk id="5" creationId="{34E296AF-B166-4A1E-9048-F32217F643C8}"/>
+          </ac:picMkLst>
+        </pc:picChg>
+        <pc:picChg chg="add del mod">
+          <ac:chgData name="wajih ullah baig" userId="909666cdfb56e88f" providerId="LiveId" clId="{40840062-6581-4FCE-A77C-8B7FEB783C39}" dt="2024-07-25T07:20:49.392" v="1251" actId="478"/>
           <ac:picMkLst>
             <pc:docMk/>
             <pc:sldMk cId="3956849390" sldId="321"/>
@@ -550,8 +591,8 @@
             <ac:picMk id="8" creationId="{B2D34C95-293A-4B0B-9C7B-4B8B2AC9F938}"/>
           </ac:picMkLst>
         </pc:picChg>
-        <pc:picChg chg="add mod">
-          <ac:chgData name="wajih ullah baig" userId="909666cdfb56e88f" providerId="LiveId" clId="{40840062-6581-4FCE-A77C-8B7FEB783C39}" dt="2024-07-24T04:51:57.942" v="779" actId="14100"/>
+        <pc:picChg chg="add del mod">
+          <ac:chgData name="wajih ullah baig" userId="909666cdfb56e88f" providerId="LiveId" clId="{40840062-6581-4FCE-A77C-8B7FEB783C39}" dt="2024-07-25T07:20:50.090" v="1252" actId="478"/>
           <ac:picMkLst>
             <pc:docMk/>
             <pc:sldMk cId="3956849390" sldId="321"/>
@@ -560,17 +601,25 @@
         </pc:picChg>
       </pc:sldChg>
       <pc:sldChg chg="addSp delSp modSp add mod">
-        <pc:chgData name="wajih ullah baig" userId="909666cdfb56e88f" providerId="LiveId" clId="{40840062-6581-4FCE-A77C-8B7FEB783C39}" dt="2024-07-24T04:52:41.332" v="783" actId="931"/>
+        <pc:chgData name="wajih ullah baig" userId="909666cdfb56e88f" providerId="LiveId" clId="{40840062-6581-4FCE-A77C-8B7FEB783C39}" dt="2024-07-25T07:22:41.958" v="1254" actId="931"/>
         <pc:sldMkLst>
           <pc:docMk/>
           <pc:sldMk cId="1228517852" sldId="322"/>
         </pc:sldMkLst>
-        <pc:picChg chg="add mod">
-          <ac:chgData name="wajih ullah baig" userId="909666cdfb56e88f" providerId="LiveId" clId="{40840062-6581-4FCE-A77C-8B7FEB783C39}" dt="2024-07-24T04:52:41.332" v="783" actId="931"/>
+        <pc:picChg chg="add del mod">
+          <ac:chgData name="wajih ullah baig" userId="909666cdfb56e88f" providerId="LiveId" clId="{40840062-6581-4FCE-A77C-8B7FEB783C39}" dt="2024-07-25T07:22:26.559" v="1253" actId="478"/>
           <ac:picMkLst>
             <pc:docMk/>
             <pc:sldMk cId="1228517852" sldId="322"/>
             <ac:picMk id="3" creationId="{F904BF15-D4A4-4D7B-9F08-065B9BABE640}"/>
+          </ac:picMkLst>
+        </pc:picChg>
+        <pc:picChg chg="add mod">
+          <ac:chgData name="wajih ullah baig" userId="909666cdfb56e88f" providerId="LiveId" clId="{40840062-6581-4FCE-A77C-8B7FEB783C39}" dt="2024-07-25T07:22:41.958" v="1254" actId="931"/>
+          <ac:picMkLst>
+            <pc:docMk/>
+            <pc:sldMk cId="1228517852" sldId="322"/>
+            <ac:picMk id="4" creationId="{C4D4E284-D4B6-433E-A98D-FE54FE7E7386}"/>
           </ac:picMkLst>
         </pc:picChg>
         <pc:picChg chg="del">
@@ -587,6 +636,124 @@
             <pc:docMk/>
             <pc:sldMk cId="1228517852" sldId="322"/>
             <ac:picMk id="12" creationId="{F52E434E-7090-44A3-90F3-37471E1C9589}"/>
+          </ac:picMkLst>
+        </pc:picChg>
+      </pc:sldChg>
+      <pc:sldChg chg="delSp modSp new del mod">
+        <pc:chgData name="wajih ullah baig" userId="909666cdfb56e88f" providerId="LiveId" clId="{40840062-6581-4FCE-A77C-8B7FEB783C39}" dt="2024-07-25T06:07:43.739" v="1057" actId="2696"/>
+        <pc:sldMkLst>
+          <pc:docMk/>
+          <pc:sldMk cId="1460512755" sldId="323"/>
+        </pc:sldMkLst>
+        <pc:spChg chg="del">
+          <ac:chgData name="wajih ullah baig" userId="909666cdfb56e88f" providerId="LiveId" clId="{40840062-6581-4FCE-A77C-8B7FEB783C39}" dt="2024-07-25T06:07:37.845" v="1055" actId="478"/>
+          <ac:spMkLst>
+            <pc:docMk/>
+            <pc:sldMk cId="1460512755" sldId="323"/>
+            <ac:spMk id="2" creationId="{088B12F6-5720-46E1-9912-116086965A79}"/>
+          </ac:spMkLst>
+        </pc:spChg>
+        <pc:spChg chg="del">
+          <ac:chgData name="wajih ullah baig" userId="909666cdfb56e88f" providerId="LiveId" clId="{40840062-6581-4FCE-A77C-8B7FEB783C39}" dt="2024-07-25T06:07:39.911" v="1056" actId="478"/>
+          <ac:spMkLst>
+            <pc:docMk/>
+            <pc:sldMk cId="1460512755" sldId="323"/>
+            <ac:spMk id="3" creationId="{A7F3695E-F4C5-470D-B55F-615E292D32AC}"/>
+          </ac:spMkLst>
+        </pc:spChg>
+        <pc:spChg chg="mod">
+          <ac:chgData name="wajih ullah baig" userId="909666cdfb56e88f" providerId="LiveId" clId="{40840062-6581-4FCE-A77C-8B7FEB783C39}" dt="2024-07-25T06:07:27.755" v="1054" actId="20577"/>
+          <ac:spMkLst>
+            <pc:docMk/>
+            <pc:sldMk cId="1460512755" sldId="323"/>
+            <ac:spMk id="4" creationId="{E04FB092-04A0-48F4-BA00-DB2C8C57ADCA}"/>
+          </ac:spMkLst>
+        </pc:spChg>
+        <pc:spChg chg="mod">
+          <ac:chgData name="wajih ullah baig" userId="909666cdfb56e88f" providerId="LiveId" clId="{40840062-6581-4FCE-A77C-8B7FEB783C39}" dt="2024-07-25T06:07:23.934" v="1050" actId="20577"/>
+          <ac:spMkLst>
+            <pc:docMk/>
+            <pc:sldMk cId="1460512755" sldId="323"/>
+            <ac:spMk id="5" creationId="{C15D9C5C-8E96-47DF-80B0-877F2C135BDC}"/>
+          </ac:spMkLst>
+        </pc:spChg>
+      </pc:sldChg>
+      <pc:sldChg chg="addSp delSp modSp add mod ord">
+        <pc:chgData name="wajih ullah baig" userId="909666cdfb56e88f" providerId="LiveId" clId="{40840062-6581-4FCE-A77C-8B7FEB783C39}" dt="2024-07-25T07:06:18.821" v="1248" actId="1076"/>
+        <pc:sldMkLst>
+          <pc:docMk/>
+          <pc:sldMk cId="1774567326" sldId="323"/>
+        </pc:sldMkLst>
+        <pc:spChg chg="mod">
+          <ac:chgData name="wajih ullah baig" userId="909666cdfb56e88f" providerId="LiveId" clId="{40840062-6581-4FCE-A77C-8B7FEB783C39}" dt="2024-07-25T06:15:20.381" v="1170" actId="1076"/>
+          <ac:spMkLst>
+            <pc:docMk/>
+            <pc:sldMk cId="1774567326" sldId="323"/>
+            <ac:spMk id="4" creationId="{C54FA453-CA6F-4ED8-B4B2-61C3D67FF6E5}"/>
+          </ac:spMkLst>
+        </pc:spChg>
+        <pc:spChg chg="mod">
+          <ac:chgData name="wajih ullah baig" userId="909666cdfb56e88f" providerId="LiveId" clId="{40840062-6581-4FCE-A77C-8B7FEB783C39}" dt="2024-07-25T06:20:14.341" v="1204" actId="1076"/>
+          <ac:spMkLst>
+            <pc:docMk/>
+            <pc:sldMk cId="1774567326" sldId="323"/>
+            <ac:spMk id="5" creationId="{F01866DD-53C9-4AF0-9E9A-BF19D245E8C6}"/>
+          </ac:spMkLst>
+        </pc:spChg>
+        <pc:spChg chg="add mod">
+          <ac:chgData name="wajih ullah baig" userId="909666cdfb56e88f" providerId="LiveId" clId="{40840062-6581-4FCE-A77C-8B7FEB783C39}" dt="2024-07-25T06:20:48.213" v="1234" actId="1076"/>
+          <ac:spMkLst>
+            <pc:docMk/>
+            <pc:sldMk cId="1774567326" sldId="323"/>
+            <ac:spMk id="8" creationId="{D2747362-5F5A-4DF1-A439-3AA973F1FFA2}"/>
+          </ac:spMkLst>
+        </pc:spChg>
+        <pc:picChg chg="add mod">
+          <ac:chgData name="wajih ullah baig" userId="909666cdfb56e88f" providerId="LiveId" clId="{40840062-6581-4FCE-A77C-8B7FEB783C39}" dt="2024-07-25T07:06:03.189" v="1246" actId="14100"/>
+          <ac:picMkLst>
+            <pc:docMk/>
+            <pc:sldMk cId="1774567326" sldId="323"/>
+            <ac:picMk id="7" creationId="{9C46C5C2-993D-4C03-9C0C-CE72B6CC9D2A}"/>
+          </ac:picMkLst>
+        </pc:picChg>
+        <pc:picChg chg="add mod">
+          <ac:chgData name="wajih ullah baig" userId="909666cdfb56e88f" providerId="LiveId" clId="{40840062-6581-4FCE-A77C-8B7FEB783C39}" dt="2024-07-25T07:06:05.228" v="1247" actId="14100"/>
+          <ac:picMkLst>
+            <pc:docMk/>
+            <pc:sldMk cId="1774567326" sldId="323"/>
+            <ac:picMk id="10" creationId="{939879F4-B8CA-4D62-82D5-21F10D6AD463}"/>
+          </ac:picMkLst>
+        </pc:picChg>
+        <pc:picChg chg="del">
+          <ac:chgData name="wajih ullah baig" userId="909666cdfb56e88f" providerId="LiveId" clId="{40840062-6581-4FCE-A77C-8B7FEB783C39}" dt="2024-07-25T06:08:02.529" v="1061" actId="478"/>
+          <ac:picMkLst>
+            <pc:docMk/>
+            <pc:sldMk cId="1774567326" sldId="323"/>
+            <ac:picMk id="1026" creationId="{9A2EA255-005D-4C1E-9064-054755774040}"/>
+          </ac:picMkLst>
+        </pc:picChg>
+        <pc:picChg chg="add del mod">
+          <ac:chgData name="wajih ullah baig" userId="909666cdfb56e88f" providerId="LiveId" clId="{40840062-6581-4FCE-A77C-8B7FEB783C39}" dt="2024-07-25T06:19:05.503" v="1201"/>
+          <ac:picMkLst>
+            <pc:docMk/>
+            <pc:sldMk cId="1774567326" sldId="323"/>
+            <ac:picMk id="1028" creationId="{32BFE2EE-DC5F-4EDB-93B3-724224DCCED4}"/>
+          </ac:picMkLst>
+        </pc:picChg>
+        <pc:picChg chg="add mod">
+          <ac:chgData name="wajih ullah baig" userId="909666cdfb56e88f" providerId="LiveId" clId="{40840062-6581-4FCE-A77C-8B7FEB783C39}" dt="2024-07-25T07:06:18.821" v="1248" actId="1076"/>
+          <ac:picMkLst>
+            <pc:docMk/>
+            <pc:sldMk cId="1774567326" sldId="323"/>
+            <ac:picMk id="1030" creationId="{745C8D81-73B0-494A-BBBF-D9FE87421A22}"/>
+          </ac:picMkLst>
+        </pc:picChg>
+        <pc:picChg chg="del">
+          <ac:chgData name="wajih ullah baig" userId="909666cdfb56e88f" providerId="LiveId" clId="{40840062-6581-4FCE-A77C-8B7FEB783C39}" dt="2024-07-25T06:08:03.730" v="1062" actId="478"/>
+          <ac:picMkLst>
+            <pc:docMk/>
+            <pc:sldMk cId="1774567326" sldId="323"/>
+            <ac:picMk id="1036" creationId="{F3EB30BB-470C-41B7-B063-AF7EF18F2917}"/>
           </ac:picMkLst>
         </pc:picChg>
       </pc:sldChg>
@@ -629,6 +796,29 @@
           </ac:picMkLst>
         </pc:picChg>
       </pc:sldChg>
+      <pc:sldChg chg="modSp add mod setBg">
+        <pc:chgData name="wajih ullah baig" userId="909666cdfb56e88f" providerId="LiveId" clId="{40840062-6581-4FCE-A77C-8B7FEB783C39}" dt="2024-07-25T07:26:00.974" v="1636" actId="20577"/>
+        <pc:sldMkLst>
+          <pc:docMk/>
+          <pc:sldMk cId="1202668235" sldId="324"/>
+        </pc:sldMkLst>
+        <pc:spChg chg="mod">
+          <ac:chgData name="wajih ullah baig" userId="909666cdfb56e88f" providerId="LiveId" clId="{40840062-6581-4FCE-A77C-8B7FEB783C39}" dt="2024-07-25T07:23:56.126" v="1270" actId="1076"/>
+          <ac:spMkLst>
+            <pc:docMk/>
+            <pc:sldMk cId="1202668235" sldId="324"/>
+            <ac:spMk id="2" creationId="{8460295B-54B9-4937-90E3-BAB9CE69E30B}"/>
+          </ac:spMkLst>
+        </pc:spChg>
+        <pc:spChg chg="mod">
+          <ac:chgData name="wajih ullah baig" userId="909666cdfb56e88f" providerId="LiveId" clId="{40840062-6581-4FCE-A77C-8B7FEB783C39}" dt="2024-07-25T07:26:00.974" v="1636" actId="20577"/>
+          <ac:spMkLst>
+            <pc:docMk/>
+            <pc:sldMk cId="1202668235" sldId="324"/>
+            <ac:spMk id="4" creationId="{D51A6D85-3837-435F-A342-5A3F98172B12}"/>
+          </ac:spMkLst>
+        </pc:spChg>
+      </pc:sldChg>
     </pc:docChg>
   </pc:docChgLst>
 </pc:chgInfo>
@@ -716,7 +906,7 @@
           <a:p>
             <a:fld id="{656B1857-7F2F-4FA5-AC91-CA6CB406E5ED}" type="datetimeFigureOut">
               <a:rPr lang="en-US" smtClean="0"/>
-              <a:t>7/24/2024</a:t>
+              <a:t>7/25/2024</a:t>
             </a:fld>
             <a:endParaRPr lang="en-US" dirty="0"/>
           </a:p>
@@ -1048,7 +1238,7 @@
           <a:p>
             <a:fld id="{D2537BDE-FCE3-41C4-B976-0DC28743AC5A}" type="slidenum">
               <a:rPr lang="en-US" smtClean="0"/>
-              <a:t>10</a:t>
+              <a:t>12</a:t>
             </a:fld>
             <a:endParaRPr lang="en-US" dirty="0"/>
           </a:p>
@@ -9872,6 +10062,156 @@
           <a:chExt cx="0" cy="0"/>
         </a:xfrm>
       </p:grpSpPr>
+      <p:pic>
+        <p:nvPicPr>
+          <p:cNvPr id="3" name="Picture 2">
+            <a:extLst>
+              <a:ext uri="{FF2B5EF4-FFF2-40B4-BE49-F238E27FC236}">
+                <a16:creationId xmlns:a16="http://schemas.microsoft.com/office/drawing/2014/main" id="{3D32B62A-FCD7-4B7F-82A4-34D02887E12B}"/>
+              </a:ext>
+            </a:extLst>
+          </p:cNvPr>
+          <p:cNvPicPr>
+            <a:picLocks noChangeAspect="1"/>
+          </p:cNvPicPr>
+          <p:nvPr/>
+        </p:nvPicPr>
+        <p:blipFill>
+          <a:blip r:embed="rId2"/>
+          <a:stretch>
+            <a:fillRect/>
+          </a:stretch>
+        </p:blipFill>
+        <p:spPr>
+          <a:xfrm>
+            <a:off x="1196516" y="1157680"/>
+            <a:ext cx="4899484" cy="3530344"/>
+          </a:xfrm>
+          <a:prstGeom prst="rect">
+            <a:avLst/>
+          </a:prstGeom>
+        </p:spPr>
+      </p:pic>
+      <p:pic>
+        <p:nvPicPr>
+          <p:cNvPr id="5" name="Picture 4">
+            <a:extLst>
+              <a:ext uri="{FF2B5EF4-FFF2-40B4-BE49-F238E27FC236}">
+                <a16:creationId xmlns:a16="http://schemas.microsoft.com/office/drawing/2014/main" id="{34E296AF-B166-4A1E-9048-F32217F643C8}"/>
+              </a:ext>
+            </a:extLst>
+          </p:cNvPr>
+          <p:cNvPicPr>
+            <a:picLocks noChangeAspect="1"/>
+          </p:cNvPicPr>
+          <p:nvPr/>
+        </p:nvPicPr>
+        <p:blipFill>
+          <a:blip r:embed="rId3"/>
+          <a:stretch>
+            <a:fillRect/>
+          </a:stretch>
+        </p:blipFill>
+        <p:spPr>
+          <a:xfrm>
+            <a:off x="6370399" y="1157680"/>
+            <a:ext cx="4625085" cy="3555226"/>
+          </a:xfrm>
+          <a:prstGeom prst="rect">
+            <a:avLst/>
+          </a:prstGeom>
+        </p:spPr>
+      </p:pic>
+    </p:spTree>
+    <p:extLst>
+      <p:ext uri="{BB962C8B-B14F-4D97-AF65-F5344CB8AC3E}">
+        <p14:creationId xmlns:p14="http://schemas.microsoft.com/office/powerpoint/2010/main" val="3956849390"/>
+      </p:ext>
+    </p:extLst>
+  </p:cSld>
+  <p:clrMapOvr>
+    <a:masterClrMapping/>
+  </p:clrMapOvr>
+</p:sld>
+</file>
+
+<file path=ppt/slides/slide11.xml><?xml version="1.0" encoding="utf-8"?>
+<p:sld xmlns:a="http://schemas.openxmlformats.org/drawingml/2006/main" xmlns:r="http://schemas.openxmlformats.org/officeDocument/2006/relationships" xmlns:p="http://schemas.openxmlformats.org/presentationml/2006/main">
+  <p:cSld>
+    <p:spTree>
+      <p:nvGrpSpPr>
+        <p:cNvPr id="1" name=""/>
+        <p:cNvGrpSpPr/>
+        <p:nvPr/>
+      </p:nvGrpSpPr>
+      <p:grpSpPr>
+        <a:xfrm>
+          <a:off x="0" y="0"/>
+          <a:ext cx="0" cy="0"/>
+          <a:chOff x="0" y="0"/>
+          <a:chExt cx="0" cy="0"/>
+        </a:xfrm>
+      </p:grpSpPr>
+      <p:pic>
+        <p:nvPicPr>
+          <p:cNvPr id="4" name="Picture 3">
+            <a:extLst>
+              <a:ext uri="{FF2B5EF4-FFF2-40B4-BE49-F238E27FC236}">
+                <a16:creationId xmlns:a16="http://schemas.microsoft.com/office/drawing/2014/main" id="{C4D4E284-D4B6-433E-A98D-FE54FE7E7386}"/>
+              </a:ext>
+            </a:extLst>
+          </p:cNvPr>
+          <p:cNvPicPr>
+            <a:picLocks noChangeAspect="1"/>
+          </p:cNvPicPr>
+          <p:nvPr/>
+        </p:nvPicPr>
+        <p:blipFill>
+          <a:blip r:embed="rId2"/>
+          <a:stretch>
+            <a:fillRect/>
+          </a:stretch>
+        </p:blipFill>
+        <p:spPr>
+          <a:xfrm>
+            <a:off x="3048000" y="1714500"/>
+            <a:ext cx="6096000" cy="3429000"/>
+          </a:xfrm>
+          <a:prstGeom prst="rect">
+            <a:avLst/>
+          </a:prstGeom>
+        </p:spPr>
+      </p:pic>
+    </p:spTree>
+    <p:extLst>
+      <p:ext uri="{BB962C8B-B14F-4D97-AF65-F5344CB8AC3E}">
+        <p14:creationId xmlns:p14="http://schemas.microsoft.com/office/powerpoint/2010/main" val="1228517852"/>
+      </p:ext>
+    </p:extLst>
+  </p:cSld>
+  <p:clrMapOvr>
+    <a:masterClrMapping/>
+  </p:clrMapOvr>
+</p:sld>
+</file>
+
+<file path=ppt/slides/slide12.xml><?xml version="1.0" encoding="utf-8"?>
+<p:sld xmlns:a="http://schemas.openxmlformats.org/drawingml/2006/main" xmlns:r="http://schemas.openxmlformats.org/officeDocument/2006/relationships" xmlns:p="http://schemas.openxmlformats.org/presentationml/2006/main">
+  <p:cSld>
+    <p:spTree>
+      <p:nvGrpSpPr>
+        <p:cNvPr id="1" name=""/>
+        <p:cNvGrpSpPr/>
+        <p:nvPr/>
+      </p:nvGrpSpPr>
+      <p:grpSpPr>
+        <a:xfrm>
+          <a:off x="0" y="0"/>
+          <a:ext cx="0" cy="0"/>
+          <a:chOff x="0" y="0"/>
+          <a:chExt cx="0" cy="0"/>
+        </a:xfrm>
+      </p:grpSpPr>
       <p:sp>
         <p:nvSpPr>
           <p:cNvPr id="33" name="Title 32">
@@ -9980,7 +10320,7 @@
         <p:spPr>
           <a:xfrm>
             <a:off x="1604905" y="3728425"/>
-            <a:ext cx="5181735" cy="2534890"/>
+            <a:ext cx="6666640" cy="2534890"/>
           </a:xfrm>
         </p:spPr>
         <p:txBody>
@@ -9991,6 +10331,18 @@
               <a:rPr lang="en-US" dirty="0"/>
               <a:t>Wajih Ullah Baig</a:t>
             </a:r>
+          </a:p>
+          <a:p>
+            <a:endParaRPr lang="en-US" dirty="0"/>
+          </a:p>
+          <a:p>
+            <a:r>
+              <a:rPr lang="en-US" dirty="0">
+                <a:hlinkClick r:id="rId3"/>
+              </a:rPr>
+              <a:t>https://github.com/wajihullahbaig/video_clustering</a:t>
+            </a:r>
+            <a:endParaRPr lang="en-US" dirty="0"/>
           </a:p>
           <a:p>
             <a:endParaRPr lang="en-US" dirty="0"/>
@@ -10021,7 +10373,7 @@
             <a:fld id="{294A09A9-5501-47C1-A89A-A340965A2BE2}" type="slidenum">
               <a:rPr lang="en-US" smtClean="0"/>
               <a:pPr/>
-              <a:t>10</a:t>
+              <a:t>12</a:t>
             </a:fld>
             <a:endParaRPr lang="en-US" dirty="0"/>
           </a:p>
@@ -10130,16 +10482,13 @@
           <a:p>
             <a:r>
               <a:rPr lang="en-US" dirty="0"/>
-              <a:t>Code</a:t>
-            </a:r>
-          </a:p>
-          <a:p>
-            <a:r>
-              <a:rPr lang="en-US" dirty="0"/>
-              <a:t>Final Output</a:t>
-            </a:r>
-          </a:p>
-          <a:p>
+              <a:t>Code demo</a:t>
+            </a:r>
+          </a:p>
+          <a:p>
+            <a:pPr marL="0" indent="0">
+              <a:buNone/>
+            </a:pPr>
             <a:endParaRPr lang="en-US" dirty="0"/>
           </a:p>
         </p:txBody>
@@ -10628,7 +10977,7 @@
           <a:p>
             <a:r>
               <a:rPr lang="en-US" dirty="0"/>
-              <a:t>There are many, some are local some are global or holistic image features. </a:t>
+              <a:t>There are many, some are local some are global or holistic image features.  For example, SIFT, SURF, ORB, BRIEF,GIST</a:t>
             </a:r>
           </a:p>
           <a:p>
@@ -10768,10 +11117,10 @@
       </p:grpSpPr>
       <p:sp>
         <p:nvSpPr>
-          <p:cNvPr id="3" name="Content Placeholder 2">
-            <a:extLst>
-              <a:ext uri="{FF2B5EF4-FFF2-40B4-BE49-F238E27FC236}">
-                <a16:creationId xmlns:a16="http://schemas.microsoft.com/office/drawing/2014/main" id="{065994E4-45F6-40E9-98B7-10B9F6F0503C}"/>
+          <p:cNvPr id="4" name="Title 3">
+            <a:extLst>
+              <a:ext uri="{FF2B5EF4-FFF2-40B4-BE49-F238E27FC236}">
+                <a16:creationId xmlns:a16="http://schemas.microsoft.com/office/drawing/2014/main" id="{C54FA453-CA6F-4ED8-B4B2-61C3D67FF6E5}"/>
               </a:ext>
             </a:extLst>
           </p:cNvPr>
@@ -10779,55 +11128,34 @@
             <a:spLocks noGrp="1"/>
           </p:cNvSpPr>
           <p:nvPr>
-            <p:ph idx="1"/>
-          </p:nvPr>
-        </p:nvSpPr>
-        <p:spPr>
-          <a:xfrm>
-            <a:off x="6392583" y="536567"/>
-            <a:ext cx="4518504" cy="5784867"/>
-          </a:xfrm>
-        </p:spPr>
-        <p:txBody>
-          <a:bodyPr/>
+            <p:ph type="title"/>
+          </p:nvPr>
+        </p:nvSpPr>
+        <p:spPr>
+          <a:xfrm>
+            <a:off x="6918411" y="277911"/>
+            <a:ext cx="4434721" cy="670046"/>
+          </a:xfrm>
+        </p:spPr>
+        <p:txBody>
+          <a:bodyPr>
+            <a:noAutofit/>
+          </a:bodyPr>
           <a:lstStyle/>
           <a:p>
             <a:r>
-              <a:rPr lang="en-US" b="0" i="0" dirty="0">
-                <a:effectLst/>
-                <a:latin typeface="Google Sans"/>
-              </a:rPr>
-              <a:t>LBP (Local Binary Pattern) features encode local texture information, which you can use for tasks such as classification, detection, and recognition. The function partitions the input image into non-overlapping cells. To collect information over larger regions, select larger cell sizes</a:t>
-            </a:r>
-            <a:br>
-              <a:rPr lang="en-US" b="0" i="0" dirty="0">
-                <a:effectLst/>
-                <a:latin typeface="Google Sans"/>
-              </a:rPr>
-            </a:br>
-            <a:br>
-              <a:rPr lang="en-US" b="0" i="0" dirty="0">
-                <a:effectLst/>
-                <a:latin typeface="Google Sans"/>
-              </a:rPr>
-            </a:br>
-            <a:r>
-              <a:rPr lang="en-US" dirty="0">
-                <a:latin typeface="Google Sans"/>
-                <a:hlinkClick r:id="rId2"/>
-              </a:rPr>
-              <a:t>Local Binary Pattern</a:t>
-            </a:r>
-            <a:endParaRPr lang="en-US" dirty="0"/>
-          </a:p>
-        </p:txBody>
-      </p:sp>
-      <p:sp>
-        <p:nvSpPr>
-          <p:cNvPr id="4" name="Date Placeholder 3">
-            <a:extLst>
-              <a:ext uri="{FF2B5EF4-FFF2-40B4-BE49-F238E27FC236}">
-                <a16:creationId xmlns:a16="http://schemas.microsoft.com/office/drawing/2014/main" id="{07A2CE36-90A6-4F11-9E0A-6B9138AACEDE}"/>
+              <a:rPr lang="en-US" sz="3200" dirty="0"/>
+              <a:t>Types of descriptors</a:t>
+            </a:r>
+          </a:p>
+        </p:txBody>
+      </p:sp>
+      <p:sp>
+        <p:nvSpPr>
+          <p:cNvPr id="5" name="Content Placeholder 4">
+            <a:extLst>
+              <a:ext uri="{FF2B5EF4-FFF2-40B4-BE49-F238E27FC236}">
+                <a16:creationId xmlns:a16="http://schemas.microsoft.com/office/drawing/2014/main" id="{F01866DD-53C9-4AF0-9E9A-BF19D245E8C6}"/>
               </a:ext>
             </a:extLst>
           </p:cNvPr>
@@ -10835,27 +11163,95 @@
             <a:spLocks noGrp="1"/>
           </p:cNvSpPr>
           <p:nvPr>
-            <p:ph type="dt" sz="half" idx="12"/>
-          </p:nvPr>
-        </p:nvSpPr>
-        <p:spPr/>
+            <p:ph idx="1"/>
+          </p:nvPr>
+        </p:nvSpPr>
+        <p:spPr>
+          <a:xfrm>
+            <a:off x="7151442" y="1102348"/>
+            <a:ext cx="4434721" cy="1666019"/>
+          </a:xfrm>
+        </p:spPr>
         <p:txBody>
           <a:bodyPr/>
           <a:lstStyle/>
           <a:p>
             <a:r>
-              <a:rPr lang="en-US" dirty="0"/>
-              <a:t>2024</a:t>
-            </a:r>
-          </a:p>
-        </p:txBody>
-      </p:sp>
-      <p:sp>
-        <p:nvSpPr>
-          <p:cNvPr id="5" name="Footer Placeholder 4">
-            <a:extLst>
-              <a:ext uri="{FF2B5EF4-FFF2-40B4-BE49-F238E27FC236}">
-                <a16:creationId xmlns:a16="http://schemas.microsoft.com/office/drawing/2014/main" id="{E3ADE6CB-2448-465E-9919-7454477A9383}"/>
+              <a:rPr lang="en-US" sz="2000" b="1" dirty="0" err="1"/>
+              <a:t>Holisitic</a:t>
+            </a:r>
+            <a:r>
+              <a:rPr lang="en-US" sz="2000" b="1" dirty="0"/>
+              <a:t>  (Global)</a:t>
+            </a:r>
+          </a:p>
+          <a:p>
+            <a:pPr lvl="1"/>
+            <a:r>
+              <a:rPr lang="en-US" sz="2000" dirty="0"/>
+              <a:t>GIST, LBP, </a:t>
+            </a:r>
+            <a:r>
+              <a:rPr lang="en-US" sz="2000" dirty="0" err="1"/>
+              <a:t>HoG</a:t>
+            </a:r>
+            <a:endParaRPr lang="en-US" sz="2000" dirty="0"/>
+          </a:p>
+          <a:p>
+            <a:r>
+              <a:rPr lang="en-US" sz="2000" b="1" dirty="0"/>
+              <a:t>Local</a:t>
+            </a:r>
+          </a:p>
+          <a:p>
+            <a:pPr lvl="1"/>
+            <a:r>
+              <a:rPr lang="en-US" sz="2000" dirty="0"/>
+              <a:t>SIFT, SURF</a:t>
+            </a:r>
+          </a:p>
+          <a:p>
+            <a:pPr lvl="1"/>
+            <a:endParaRPr lang="en-US" sz="2000" dirty="0"/>
+          </a:p>
+          <a:p>
+            <a:pPr marL="457200" lvl="1" indent="0">
+              <a:buNone/>
+            </a:pPr>
+            <a:endParaRPr lang="en-US" sz="2000" dirty="0"/>
+          </a:p>
+          <a:p>
+            <a:pPr marL="457200" lvl="1" indent="0">
+              <a:buNone/>
+            </a:pPr>
+            <a:endParaRPr lang="en-US" sz="2000" dirty="0"/>
+          </a:p>
+          <a:p>
+            <a:pPr marL="457200" lvl="1" indent="0">
+              <a:buNone/>
+            </a:pPr>
+            <a:endParaRPr lang="en-US" sz="2000" dirty="0"/>
+          </a:p>
+          <a:p>
+            <a:pPr marL="457200" lvl="1" indent="0">
+              <a:buNone/>
+            </a:pPr>
+            <a:endParaRPr lang="en-US" sz="2000" dirty="0"/>
+          </a:p>
+          <a:p>
+            <a:pPr marL="0" indent="0">
+              <a:buNone/>
+            </a:pPr>
+            <a:endParaRPr lang="en-US" dirty="0"/>
+          </a:p>
+        </p:txBody>
+      </p:sp>
+      <p:sp>
+        <p:nvSpPr>
+          <p:cNvPr id="2" name="Date Placeholder 1">
+            <a:extLst>
+              <a:ext uri="{FF2B5EF4-FFF2-40B4-BE49-F238E27FC236}">
+                <a16:creationId xmlns:a16="http://schemas.microsoft.com/office/drawing/2014/main" id="{CCD9AA72-61E2-4CEE-8E0C-A793B0EBE00D}"/>
               </a:ext>
             </a:extLst>
           </p:cNvPr>
@@ -10863,27 +11259,32 @@
             <a:spLocks noGrp="1"/>
           </p:cNvSpPr>
           <p:nvPr>
-            <p:ph type="ftr" sz="quarter" idx="13"/>
-          </p:nvPr>
-        </p:nvSpPr>
-        <p:spPr/>
+            <p:ph type="dt" sz="half" idx="12"/>
+          </p:nvPr>
+        </p:nvSpPr>
+        <p:spPr>
+          <a:xfrm>
+            <a:off x="5785751" y="6356350"/>
+            <a:ext cx="2743200" cy="365125"/>
+          </a:xfrm>
+        </p:spPr>
         <p:txBody>
           <a:bodyPr/>
           <a:lstStyle/>
           <a:p>
             <a:r>
               <a:rPr lang="en-US" dirty="0"/>
-              <a:t>Open sourced presentation</a:t>
-            </a:r>
-          </a:p>
-        </p:txBody>
-      </p:sp>
-      <p:sp>
-        <p:nvSpPr>
-          <p:cNvPr id="6" name="Slide Number Placeholder 5">
-            <a:extLst>
-              <a:ext uri="{FF2B5EF4-FFF2-40B4-BE49-F238E27FC236}">
-                <a16:creationId xmlns:a16="http://schemas.microsoft.com/office/drawing/2014/main" id="{6034D430-E0CC-4442-BDFA-D14BE301741E}"/>
+              <a:t>2024</a:t>
+            </a:r>
+          </a:p>
+        </p:txBody>
+      </p:sp>
+      <p:sp>
+        <p:nvSpPr>
+          <p:cNvPr id="3" name="Footer Placeholder 2">
+            <a:extLst>
+              <a:ext uri="{FF2B5EF4-FFF2-40B4-BE49-F238E27FC236}">
+                <a16:creationId xmlns:a16="http://schemas.microsoft.com/office/drawing/2014/main" id="{8FA222E3-EF0C-4EAB-9068-4D5E7574C8DA}"/>
               </a:ext>
             </a:extLst>
           </p:cNvPr>
@@ -10891,10 +11292,48 @@
             <a:spLocks noGrp="1"/>
           </p:cNvSpPr>
           <p:nvPr>
+            <p:ph type="ftr" sz="quarter" idx="13"/>
+          </p:nvPr>
+        </p:nvSpPr>
+        <p:spPr>
+          <a:xfrm rot="16200000">
+            <a:off x="9812116" y="1591485"/>
+            <a:ext cx="3548094" cy="365125"/>
+          </a:xfrm>
+        </p:spPr>
+        <p:txBody>
+          <a:bodyPr/>
+          <a:lstStyle/>
+          <a:p>
+            <a:r>
+              <a:rPr lang="en-US" dirty="0"/>
+              <a:t>Open sourced presentation</a:t>
+            </a:r>
+          </a:p>
+        </p:txBody>
+      </p:sp>
+      <p:sp>
+        <p:nvSpPr>
+          <p:cNvPr id="6" name="Slide Number Placeholder 5">
+            <a:extLst>
+              <a:ext uri="{FF2B5EF4-FFF2-40B4-BE49-F238E27FC236}">
+                <a16:creationId xmlns:a16="http://schemas.microsoft.com/office/drawing/2014/main" id="{B46D5BE6-8E82-44B7-AF20-20405C0CE58E}"/>
+              </a:ext>
+            </a:extLst>
+          </p:cNvPr>
+          <p:cNvSpPr>
+            <a:spLocks noGrp="1"/>
+          </p:cNvSpPr>
+          <p:nvPr>
             <p:ph type="sldNum" sz="quarter" idx="14"/>
           </p:nvPr>
         </p:nvSpPr>
-        <p:spPr/>
+        <p:spPr>
+          <a:xfrm>
+            <a:off x="8610600" y="6356350"/>
+            <a:ext cx="2743200" cy="365125"/>
+          </a:xfrm>
+        </p:spPr>
         <p:txBody>
           <a:bodyPr/>
           <a:lstStyle/>
@@ -10910,10 +11349,10 @@
       </p:sp>
       <p:pic>
         <p:nvPicPr>
-          <p:cNvPr id="1026" name="Picture 2">
-            <a:extLst>
-              <a:ext uri="{FF2B5EF4-FFF2-40B4-BE49-F238E27FC236}">
-                <a16:creationId xmlns:a16="http://schemas.microsoft.com/office/drawing/2014/main" id="{2507EE55-CD19-44AE-8939-ED69FCB35BD3}"/>
+          <p:cNvPr id="7" name="Picture 2">
+            <a:extLst>
+              <a:ext uri="{FF2B5EF4-FFF2-40B4-BE49-F238E27FC236}">
+                <a16:creationId xmlns:a16="http://schemas.microsoft.com/office/drawing/2014/main" id="{9C46C5C2-993D-4C03-9C0C-CE72B6CC9D2A}"/>
               </a:ext>
             </a:extLst>
           </p:cNvPr>
@@ -10923,7 +11362,7 @@
           <p:nvPr/>
         </p:nvPicPr>
         <p:blipFill>
-          <a:blip r:embed="rId3">
+          <a:blip r:embed="rId2">
             <a:extLst>
               <a:ext uri="{28A0092B-C50C-407E-A947-70E740481C1C}">
                 <a14:useLocalDpi xmlns:a14="http://schemas.microsoft.com/office/drawing/2010/main" val="0"/>
@@ -10937,8 +11376,8 @@
         </p:blipFill>
         <p:spPr bwMode="auto">
           <a:xfrm>
-            <a:off x="1280913" y="1204562"/>
-            <a:ext cx="3448050" cy="1781175"/>
+            <a:off x="1" y="0"/>
+            <a:ext cx="6400800" cy="1670209"/>
           </a:xfrm>
           <a:prstGeom prst="rect">
             <a:avLst/>
@@ -10955,12 +11394,59 @@
           </a:extLst>
         </p:spPr>
       </p:pic>
+      <p:sp>
+        <p:nvSpPr>
+          <p:cNvPr id="8" name="TextBox 7">
+            <a:extLst>
+              <a:ext uri="{FF2B5EF4-FFF2-40B4-BE49-F238E27FC236}">
+                <a16:creationId xmlns:a16="http://schemas.microsoft.com/office/drawing/2014/main" id="{D2747362-5F5A-4DF1-A439-3AA973F1FFA2}"/>
+              </a:ext>
+            </a:extLst>
+          </p:cNvPr>
+          <p:cNvSpPr txBox="1"/>
+          <p:nvPr/>
+        </p:nvSpPr>
+        <p:spPr>
+          <a:xfrm>
+            <a:off x="7348057" y="2835065"/>
+            <a:ext cx="2525086" cy="646331"/>
+          </a:xfrm>
+          <a:prstGeom prst="rect">
+            <a:avLst/>
+          </a:prstGeom>
+          <a:noFill/>
+        </p:spPr>
+        <p:txBody>
+          <a:bodyPr wrap="square" rtlCol="0">
+            <a:spAutoFit/>
+          </a:bodyPr>
+          <a:lstStyle/>
+          <a:p>
+            <a:r>
+              <a:rPr lang="en-US" dirty="0">
+                <a:hlinkClick r:id="rId3"/>
+              </a:rPr>
+              <a:t>gist image</a:t>
+            </a:r>
+            <a:br>
+              <a:rPr lang="en-US" dirty="0"/>
+            </a:br>
+            <a:r>
+              <a:rPr lang="en-US" dirty="0">
+                <a:hlinkClick r:id="rId4"/>
+              </a:rPr>
+              <a:t>sift image</a:t>
+            </a:r>
+            <a:endParaRPr lang="en-AE" dirty="0"/>
+          </a:p>
+        </p:txBody>
+      </p:sp>
       <p:pic>
         <p:nvPicPr>
-          <p:cNvPr id="1028" name="Picture 4" descr="Figure 2: Taking the 8-bit binary neighborhood of the center pixel and converting it into a decimal representation. (Thanks to Hanzra Tech for the inspiration on this visualization!)">
-            <a:extLst>
-              <a:ext uri="{FF2B5EF4-FFF2-40B4-BE49-F238E27FC236}">
-                <a16:creationId xmlns:a16="http://schemas.microsoft.com/office/drawing/2014/main" id="{86CA6EE8-6932-437F-9603-ACA5D1230A9C}"/>
+          <p:cNvPr id="1030" name="Picture 6" descr="SIFT features. (a) SIFT features extracted from a 2D slice of a brain... |  Download Scientific Diagram">
+            <a:extLst>
+              <a:ext uri="{FF2B5EF4-FFF2-40B4-BE49-F238E27FC236}">
+                <a16:creationId xmlns:a16="http://schemas.microsoft.com/office/drawing/2014/main" id="{745C8D81-73B0-494A-BBBF-D9FE87421A22}"/>
               </a:ext>
             </a:extLst>
           </p:cNvPr>
@@ -10970,7 +11456,7 @@
           <p:nvPr/>
         </p:nvPicPr>
         <p:blipFill>
-          <a:blip r:embed="rId4">
+          <a:blip r:embed="rId5">
             <a:extLst>
               <a:ext uri="{28A0092B-C50C-407E-A947-70E740481C1C}">
                 <a14:useLocalDpi xmlns:a14="http://schemas.microsoft.com/office/drawing/2010/main" val="0"/>
@@ -10984,8 +11470,8 @@
         </p:blipFill>
         <p:spPr bwMode="auto">
           <a:xfrm>
-            <a:off x="495462" y="3124844"/>
-            <a:ext cx="5125161" cy="1494839"/>
+            <a:off x="138603" y="3816594"/>
+            <a:ext cx="6496050" cy="2619375"/>
           </a:xfrm>
           <a:prstGeom prst="rect">
             <a:avLst/>
@@ -11002,10 +11488,40 @@
           </a:extLst>
         </p:spPr>
       </p:pic>
+      <p:pic>
+        <p:nvPicPr>
+          <p:cNvPr id="10" name="Picture 9">
+            <a:extLst>
+              <a:ext uri="{FF2B5EF4-FFF2-40B4-BE49-F238E27FC236}">
+                <a16:creationId xmlns:a16="http://schemas.microsoft.com/office/drawing/2014/main" id="{939879F4-B8CA-4D62-82D5-21F10D6AD463}"/>
+              </a:ext>
+            </a:extLst>
+          </p:cNvPr>
+          <p:cNvPicPr>
+            <a:picLocks noChangeAspect="1"/>
+          </p:cNvPicPr>
+          <p:nvPr/>
+        </p:nvPicPr>
+        <p:blipFill>
+          <a:blip r:embed="rId6"/>
+          <a:stretch>
+            <a:fillRect/>
+          </a:stretch>
+        </p:blipFill>
+        <p:spPr>
+          <a:xfrm>
+            <a:off x="423274" y="1670209"/>
+            <a:ext cx="5597586" cy="2039025"/>
+          </a:xfrm>
+          <a:prstGeom prst="rect">
+            <a:avLst/>
+          </a:prstGeom>
+        </p:spPr>
+      </p:pic>
     </p:spTree>
     <p:extLst>
       <p:ext uri="{BB962C8B-B14F-4D97-AF65-F5344CB8AC3E}">
-        <p14:creationId xmlns:p14="http://schemas.microsoft.com/office/powerpoint/2010/main" val="2637341354"/>
+        <p14:creationId xmlns:p14="http://schemas.microsoft.com/office/powerpoint/2010/main" val="1774567326"/>
       </p:ext>
     </p:extLst>
   </p:cSld>
@@ -11063,7 +11579,7 @@
                 <a:effectLst/>
                 <a:latin typeface="Google Sans"/>
               </a:rPr>
-              <a:t> The HOG algorithm divides an image into small cells, computes each cell's gradient orientation and magnitude, and then aggregates the gradient information into a histogram of oriented gradients</a:t>
+              <a:t>LBP (Local Binary Pattern) features encode local texture information, which you can use for tasks such as classification, detection, and recognition. The function partitions the input image into non-overlapping cells. To collect information over larger regions, select larger cell sizes</a:t>
             </a:r>
             <a:br>
               <a:rPr lang="en-US" b="0" i="0" dirty="0">
@@ -11082,6 +11598,272 @@
                 <a:latin typeface="Google Sans"/>
                 <a:hlinkClick r:id="rId2"/>
               </a:rPr>
+              <a:t>Local Binary Pattern</a:t>
+            </a:r>
+            <a:endParaRPr lang="en-US" dirty="0"/>
+          </a:p>
+        </p:txBody>
+      </p:sp>
+      <p:sp>
+        <p:nvSpPr>
+          <p:cNvPr id="4" name="Date Placeholder 3">
+            <a:extLst>
+              <a:ext uri="{FF2B5EF4-FFF2-40B4-BE49-F238E27FC236}">
+                <a16:creationId xmlns:a16="http://schemas.microsoft.com/office/drawing/2014/main" id="{07A2CE36-90A6-4F11-9E0A-6B9138AACEDE}"/>
+              </a:ext>
+            </a:extLst>
+          </p:cNvPr>
+          <p:cNvSpPr>
+            <a:spLocks noGrp="1"/>
+          </p:cNvSpPr>
+          <p:nvPr>
+            <p:ph type="dt" sz="half" idx="12"/>
+          </p:nvPr>
+        </p:nvSpPr>
+        <p:spPr/>
+        <p:txBody>
+          <a:bodyPr/>
+          <a:lstStyle/>
+          <a:p>
+            <a:r>
+              <a:rPr lang="en-US" dirty="0"/>
+              <a:t>2024</a:t>
+            </a:r>
+          </a:p>
+        </p:txBody>
+      </p:sp>
+      <p:sp>
+        <p:nvSpPr>
+          <p:cNvPr id="5" name="Footer Placeholder 4">
+            <a:extLst>
+              <a:ext uri="{FF2B5EF4-FFF2-40B4-BE49-F238E27FC236}">
+                <a16:creationId xmlns:a16="http://schemas.microsoft.com/office/drawing/2014/main" id="{E3ADE6CB-2448-465E-9919-7454477A9383}"/>
+              </a:ext>
+            </a:extLst>
+          </p:cNvPr>
+          <p:cNvSpPr>
+            <a:spLocks noGrp="1"/>
+          </p:cNvSpPr>
+          <p:nvPr>
+            <p:ph type="ftr" sz="quarter" idx="13"/>
+          </p:nvPr>
+        </p:nvSpPr>
+        <p:spPr/>
+        <p:txBody>
+          <a:bodyPr/>
+          <a:lstStyle/>
+          <a:p>
+            <a:r>
+              <a:rPr lang="en-US" dirty="0"/>
+              <a:t>Open sourced presentation</a:t>
+            </a:r>
+          </a:p>
+        </p:txBody>
+      </p:sp>
+      <p:sp>
+        <p:nvSpPr>
+          <p:cNvPr id="6" name="Slide Number Placeholder 5">
+            <a:extLst>
+              <a:ext uri="{FF2B5EF4-FFF2-40B4-BE49-F238E27FC236}">
+                <a16:creationId xmlns:a16="http://schemas.microsoft.com/office/drawing/2014/main" id="{6034D430-E0CC-4442-BDFA-D14BE301741E}"/>
+              </a:ext>
+            </a:extLst>
+          </p:cNvPr>
+          <p:cNvSpPr>
+            <a:spLocks noGrp="1"/>
+          </p:cNvSpPr>
+          <p:nvPr>
+            <p:ph type="sldNum" sz="quarter" idx="14"/>
+          </p:nvPr>
+        </p:nvSpPr>
+        <p:spPr/>
+        <p:txBody>
+          <a:bodyPr/>
+          <a:lstStyle/>
+          <a:p>
+            <a:fld id="{294A09A9-5501-47C1-A89A-A340965A2BE2}" type="slidenum">
+              <a:rPr lang="en-US" smtClean="0"/>
+              <a:pPr/>
+              <a:t>6</a:t>
+            </a:fld>
+            <a:endParaRPr lang="en-US" dirty="0"/>
+          </a:p>
+        </p:txBody>
+      </p:sp>
+      <p:pic>
+        <p:nvPicPr>
+          <p:cNvPr id="1026" name="Picture 2">
+            <a:extLst>
+              <a:ext uri="{FF2B5EF4-FFF2-40B4-BE49-F238E27FC236}">
+                <a16:creationId xmlns:a16="http://schemas.microsoft.com/office/drawing/2014/main" id="{2507EE55-CD19-44AE-8939-ED69FCB35BD3}"/>
+              </a:ext>
+            </a:extLst>
+          </p:cNvPr>
+          <p:cNvPicPr>
+            <a:picLocks noChangeAspect="1" noChangeArrowheads="1"/>
+          </p:cNvPicPr>
+          <p:nvPr/>
+        </p:nvPicPr>
+        <p:blipFill>
+          <a:blip r:embed="rId3">
+            <a:extLst>
+              <a:ext uri="{28A0092B-C50C-407E-A947-70E740481C1C}">
+                <a14:useLocalDpi xmlns:a14="http://schemas.microsoft.com/office/drawing/2010/main" val="0"/>
+              </a:ext>
+            </a:extLst>
+          </a:blip>
+          <a:srcRect/>
+          <a:stretch>
+            <a:fillRect/>
+          </a:stretch>
+        </p:blipFill>
+        <p:spPr bwMode="auto">
+          <a:xfrm>
+            <a:off x="1280913" y="1204562"/>
+            <a:ext cx="3448050" cy="1781175"/>
+          </a:xfrm>
+          <a:prstGeom prst="rect">
+            <a:avLst/>
+          </a:prstGeom>
+          <a:noFill/>
+          <a:extLst>
+            <a:ext uri="{909E8E84-426E-40DD-AFC4-6F175D3DCCD1}">
+              <a14:hiddenFill xmlns:a14="http://schemas.microsoft.com/office/drawing/2010/main">
+                <a:solidFill>
+                  <a:srgbClr val="FFFFFF"/>
+                </a:solidFill>
+              </a14:hiddenFill>
+            </a:ext>
+          </a:extLst>
+        </p:spPr>
+      </p:pic>
+      <p:pic>
+        <p:nvPicPr>
+          <p:cNvPr id="1028" name="Picture 4" descr="Figure 2: Taking the 8-bit binary neighborhood of the center pixel and converting it into a decimal representation. (Thanks to Hanzra Tech for the inspiration on this visualization!)">
+            <a:extLst>
+              <a:ext uri="{FF2B5EF4-FFF2-40B4-BE49-F238E27FC236}">
+                <a16:creationId xmlns:a16="http://schemas.microsoft.com/office/drawing/2014/main" id="{86CA6EE8-6932-437F-9603-ACA5D1230A9C}"/>
+              </a:ext>
+            </a:extLst>
+          </p:cNvPr>
+          <p:cNvPicPr>
+            <a:picLocks noChangeAspect="1" noChangeArrowheads="1"/>
+          </p:cNvPicPr>
+          <p:nvPr/>
+        </p:nvPicPr>
+        <p:blipFill>
+          <a:blip r:embed="rId4">
+            <a:extLst>
+              <a:ext uri="{28A0092B-C50C-407E-A947-70E740481C1C}">
+                <a14:useLocalDpi xmlns:a14="http://schemas.microsoft.com/office/drawing/2010/main" val="0"/>
+              </a:ext>
+            </a:extLst>
+          </a:blip>
+          <a:srcRect/>
+          <a:stretch>
+            <a:fillRect/>
+          </a:stretch>
+        </p:blipFill>
+        <p:spPr bwMode="auto">
+          <a:xfrm>
+            <a:off x="495462" y="3124844"/>
+            <a:ext cx="5125161" cy="1494839"/>
+          </a:xfrm>
+          <a:prstGeom prst="rect">
+            <a:avLst/>
+          </a:prstGeom>
+          <a:noFill/>
+          <a:extLst>
+            <a:ext uri="{909E8E84-426E-40DD-AFC4-6F175D3DCCD1}">
+              <a14:hiddenFill xmlns:a14="http://schemas.microsoft.com/office/drawing/2010/main">
+                <a:solidFill>
+                  <a:srgbClr val="FFFFFF"/>
+                </a:solidFill>
+              </a14:hiddenFill>
+            </a:ext>
+          </a:extLst>
+        </p:spPr>
+      </p:pic>
+    </p:spTree>
+    <p:extLst>
+      <p:ext uri="{BB962C8B-B14F-4D97-AF65-F5344CB8AC3E}">
+        <p14:creationId xmlns:p14="http://schemas.microsoft.com/office/powerpoint/2010/main" val="2637341354"/>
+      </p:ext>
+    </p:extLst>
+  </p:cSld>
+  <p:clrMapOvr>
+    <a:masterClrMapping/>
+  </p:clrMapOvr>
+</p:sld>
+</file>
+
+<file path=ppt/slides/slide7.xml><?xml version="1.0" encoding="utf-8"?>
+<p:sld xmlns:a="http://schemas.openxmlformats.org/drawingml/2006/main" xmlns:r="http://schemas.openxmlformats.org/officeDocument/2006/relationships" xmlns:p="http://schemas.openxmlformats.org/presentationml/2006/main">
+  <p:cSld>
+    <p:spTree>
+      <p:nvGrpSpPr>
+        <p:cNvPr id="1" name=""/>
+        <p:cNvGrpSpPr/>
+        <p:nvPr/>
+      </p:nvGrpSpPr>
+      <p:grpSpPr>
+        <a:xfrm>
+          <a:off x="0" y="0"/>
+          <a:ext cx="0" cy="0"/>
+          <a:chOff x="0" y="0"/>
+          <a:chExt cx="0" cy="0"/>
+        </a:xfrm>
+      </p:grpSpPr>
+      <p:sp>
+        <p:nvSpPr>
+          <p:cNvPr id="3" name="Content Placeholder 2">
+            <a:extLst>
+              <a:ext uri="{FF2B5EF4-FFF2-40B4-BE49-F238E27FC236}">
+                <a16:creationId xmlns:a16="http://schemas.microsoft.com/office/drawing/2014/main" id="{065994E4-45F6-40E9-98B7-10B9F6F0503C}"/>
+              </a:ext>
+            </a:extLst>
+          </p:cNvPr>
+          <p:cNvSpPr>
+            <a:spLocks noGrp="1"/>
+          </p:cNvSpPr>
+          <p:nvPr>
+            <p:ph idx="1"/>
+          </p:nvPr>
+        </p:nvSpPr>
+        <p:spPr>
+          <a:xfrm>
+            <a:off x="6392583" y="536567"/>
+            <a:ext cx="4518504" cy="5784867"/>
+          </a:xfrm>
+        </p:spPr>
+        <p:txBody>
+          <a:bodyPr/>
+          <a:lstStyle/>
+          <a:p>
+            <a:r>
+              <a:rPr lang="en-US" b="0" i="0" dirty="0">
+                <a:effectLst/>
+                <a:latin typeface="Google Sans"/>
+              </a:rPr>
+              <a:t> The HOG algorithm divides an image into small cells, computes each cell's gradient orientation and magnitude, and then aggregates the gradient information into a histogram of oriented gradients</a:t>
+            </a:r>
+            <a:br>
+              <a:rPr lang="en-US" b="0" i="0" dirty="0">
+                <a:effectLst/>
+                <a:latin typeface="Google Sans"/>
+              </a:rPr>
+            </a:br>
+            <a:br>
+              <a:rPr lang="en-US" b="0" i="0" dirty="0">
+                <a:effectLst/>
+                <a:latin typeface="Google Sans"/>
+              </a:rPr>
+            </a:br>
+            <a:r>
+              <a:rPr lang="en-US" dirty="0">
+                <a:latin typeface="Google Sans"/>
+                <a:hlinkClick r:id="rId2"/>
+              </a:rPr>
               <a:t>Histogram of Oriented Gradients</a:t>
             </a:r>
             <a:endParaRPr lang="en-US" dirty="0">
@@ -11206,7 +11988,7 @@
             <a:fld id="{294A09A9-5501-47C1-A89A-A340965A2BE2}" type="slidenum">
               <a:rPr lang="en-US" smtClean="0"/>
               <a:pPr/>
-              <a:t>6</a:t>
+              <a:t>7</a:t>
             </a:fld>
             <a:endParaRPr lang="en-US" dirty="0"/>
           </a:p>
@@ -11272,7 +12054,7 @@
 </p:sld>
 </file>
 
-<file path=ppt/slides/slide7.xml><?xml version="1.0" encoding="utf-8"?>
+<file path=ppt/slides/slide8.xml><?xml version="1.0" encoding="utf-8"?>
 <p:sld xmlns:a="http://schemas.openxmlformats.org/drawingml/2006/main" xmlns:r="http://schemas.openxmlformats.org/officeDocument/2006/relationships" xmlns:p="http://schemas.openxmlformats.org/presentationml/2006/main">
   <p:cSld>
     <p:bg>
@@ -11430,96 +12212,6 @@
 </p:sld>
 </file>
 
-<file path=ppt/slides/slide8.xml><?xml version="1.0" encoding="utf-8"?>
-<p:sld xmlns:a="http://schemas.openxmlformats.org/drawingml/2006/main" xmlns:r="http://schemas.openxmlformats.org/officeDocument/2006/relationships" xmlns:p="http://schemas.openxmlformats.org/presentationml/2006/main">
-  <p:cSld>
-    <p:spTree>
-      <p:nvGrpSpPr>
-        <p:cNvPr id="1" name=""/>
-        <p:cNvGrpSpPr/>
-        <p:nvPr/>
-      </p:nvGrpSpPr>
-      <p:grpSpPr>
-        <a:xfrm>
-          <a:off x="0" y="0"/>
-          <a:ext cx="0" cy="0"/>
-          <a:chOff x="0" y="0"/>
-          <a:chExt cx="0" cy="0"/>
-        </a:xfrm>
-      </p:grpSpPr>
-      <p:pic>
-        <p:nvPicPr>
-          <p:cNvPr id="6" name="Picture 5">
-            <a:extLst>
-              <a:ext uri="{FF2B5EF4-FFF2-40B4-BE49-F238E27FC236}">
-                <a16:creationId xmlns:a16="http://schemas.microsoft.com/office/drawing/2014/main" id="{CA8410BA-4095-4C7E-9647-D36F79365C2E}"/>
-              </a:ext>
-            </a:extLst>
-          </p:cNvPr>
-          <p:cNvPicPr>
-            <a:picLocks noChangeAspect="1"/>
-          </p:cNvPicPr>
-          <p:nvPr/>
-        </p:nvPicPr>
-        <p:blipFill>
-          <a:blip r:embed="rId2"/>
-          <a:stretch>
-            <a:fillRect/>
-          </a:stretch>
-        </p:blipFill>
-        <p:spPr>
-          <a:xfrm>
-            <a:off x="0" y="908608"/>
-            <a:ext cx="5266954" cy="3950216"/>
-          </a:xfrm>
-          <a:prstGeom prst="rect">
-            <a:avLst/>
-          </a:prstGeom>
-        </p:spPr>
-      </p:pic>
-      <p:pic>
-        <p:nvPicPr>
-          <p:cNvPr id="12" name="Picture 11">
-            <a:extLst>
-              <a:ext uri="{FF2B5EF4-FFF2-40B4-BE49-F238E27FC236}">
-                <a16:creationId xmlns:a16="http://schemas.microsoft.com/office/drawing/2014/main" id="{F52E434E-7090-44A3-90F3-37471E1C9589}"/>
-              </a:ext>
-            </a:extLst>
-          </p:cNvPr>
-          <p:cNvPicPr>
-            <a:picLocks noChangeAspect="1"/>
-          </p:cNvPicPr>
-          <p:nvPr/>
-        </p:nvPicPr>
-        <p:blipFill>
-          <a:blip r:embed="rId3"/>
-          <a:stretch>
-            <a:fillRect/>
-          </a:stretch>
-        </p:blipFill>
-        <p:spPr>
-          <a:xfrm>
-            <a:off x="5341234" y="908608"/>
-            <a:ext cx="5476291" cy="3945965"/>
-          </a:xfrm>
-          <a:prstGeom prst="rect">
-            <a:avLst/>
-          </a:prstGeom>
-        </p:spPr>
-      </p:pic>
-    </p:spTree>
-    <p:extLst>
-      <p:ext uri="{BB962C8B-B14F-4D97-AF65-F5344CB8AC3E}">
-        <p14:creationId xmlns:p14="http://schemas.microsoft.com/office/powerpoint/2010/main" val="3956849390"/>
-      </p:ext>
-    </p:extLst>
-  </p:cSld>
-  <p:clrMapOvr>
-    <a:masterClrMapping/>
-  </p:clrMapOvr>
-</p:sld>
-</file>
-
 <file path=ppt/slides/slide9.xml><?xml version="1.0" encoding="utf-8"?>
 <p:sld xmlns:a="http://schemas.openxmlformats.org/drawingml/2006/main" xmlns:r="http://schemas.openxmlformats.org/officeDocument/2006/relationships" xmlns:p="http://schemas.openxmlformats.org/presentationml/2006/main">
   <p:cSld>
@@ -11539,38 +12231,204 @@
       </p:grpSpPr>
       <p:pic>
         <p:nvPicPr>
-          <p:cNvPr id="3" name="Picture 2">
-            <a:extLst>
-              <a:ext uri="{FF2B5EF4-FFF2-40B4-BE49-F238E27FC236}">
-                <a16:creationId xmlns:a16="http://schemas.microsoft.com/office/drawing/2014/main" id="{F904BF15-D4A4-4D7B-9F08-065B9BABE640}"/>
+          <p:cNvPr id="40" name="Picture Placeholder 39" descr="A picture containing shipyard containers">
+            <a:extLst>
+              <a:ext uri="{FF2B5EF4-FFF2-40B4-BE49-F238E27FC236}">
+                <a16:creationId xmlns:a16="http://schemas.microsoft.com/office/drawing/2014/main" id="{349B49B8-DB39-4E92-A441-F8078B215C32}"/>
               </a:ext>
             </a:extLst>
           </p:cNvPr>
           <p:cNvPicPr>
-            <a:picLocks noChangeAspect="1"/>
+            <a:picLocks noGrp="1" noChangeAspect="1"/>
           </p:cNvPicPr>
-          <p:nvPr/>
+          <p:nvPr>
+            <p:ph type="pic" sz="quarter" idx="13"/>
+          </p:nvPr>
         </p:nvPicPr>
-        <p:blipFill>
-          <a:blip r:embed="rId2"/>
-          <a:stretch>
-            <a:fillRect/>
-          </a:stretch>
+        <p:blipFill rotWithShape="1">
+          <a:blip r:embed="rId2" cstate="screen">
+            <a:duotone>
+              <a:schemeClr val="accent1">
+                <a:shade val="45000"/>
+                <a:satMod val="135000"/>
+              </a:schemeClr>
+              <a:prstClr val="white"/>
+            </a:duotone>
+            <a:alphaModFix amt="35000"/>
+            <a:extLst>
+              <a:ext uri="{28A0092B-C50C-407E-A947-70E740481C1C}">
+                <a14:useLocalDpi xmlns:a14="http://schemas.microsoft.com/office/drawing/2010/main" val="0"/>
+              </a:ext>
+            </a:extLst>
+          </a:blip>
+          <a:srcRect/>
+          <a:stretch/>
         </p:blipFill>
         <p:spPr>
           <a:xfrm>
-            <a:off x="3048000" y="1714500"/>
-            <a:ext cx="6096000" cy="3429000"/>
-          </a:xfrm>
-          <a:prstGeom prst="rect">
-            <a:avLst/>
-          </a:prstGeom>
+            <a:off x="0" y="0"/>
+            <a:ext cx="12188370" cy="6858000"/>
+          </a:xfrm>
         </p:spPr>
       </p:pic>
+      <p:sp>
+        <p:nvSpPr>
+          <p:cNvPr id="2" name="Title 1">
+            <a:extLst>
+              <a:ext uri="{FF2B5EF4-FFF2-40B4-BE49-F238E27FC236}">
+                <a16:creationId xmlns:a16="http://schemas.microsoft.com/office/drawing/2014/main" id="{8460295B-54B9-4937-90E3-BAB9CE69E30B}"/>
+              </a:ext>
+            </a:extLst>
+          </p:cNvPr>
+          <p:cNvSpPr>
+            <a:spLocks noGrp="1"/>
+          </p:cNvSpPr>
+          <p:nvPr>
+            <p:ph type="title"/>
+          </p:nvPr>
+        </p:nvSpPr>
+        <p:spPr>
+          <a:xfrm>
+            <a:off x="190873" y="1009487"/>
+            <a:ext cx="3106000" cy="1152621"/>
+          </a:xfrm>
+        </p:spPr>
+        <p:txBody>
+          <a:bodyPr vert="horz" lIns="91440" tIns="45720" rIns="91440" bIns="45720" rtlCol="0" anchor="b">
+            <a:normAutofit/>
+          </a:bodyPr>
+          <a:lstStyle/>
+          <a:p>
+            <a:r>
+              <a:rPr lang="en-US" dirty="0"/>
+              <a:t>Steps</a:t>
+            </a:r>
+          </a:p>
+        </p:txBody>
+      </p:sp>
+      <p:sp>
+        <p:nvSpPr>
+          <p:cNvPr id="4" name="Text Placeholder 3">
+            <a:extLst>
+              <a:ext uri="{FF2B5EF4-FFF2-40B4-BE49-F238E27FC236}">
+                <a16:creationId xmlns:a16="http://schemas.microsoft.com/office/drawing/2014/main" id="{D51A6D85-3837-435F-A342-5A3F98172B12}"/>
+              </a:ext>
+            </a:extLst>
+          </p:cNvPr>
+          <p:cNvSpPr>
+            <a:spLocks noGrp="1"/>
+          </p:cNvSpPr>
+          <p:nvPr>
+            <p:ph type="body" idx="14"/>
+          </p:nvPr>
+        </p:nvSpPr>
+        <p:spPr>
+          <a:xfrm>
+            <a:off x="1172385" y="1969160"/>
+            <a:ext cx="8793735" cy="3651463"/>
+          </a:xfrm>
+        </p:spPr>
+        <p:txBody>
+          <a:bodyPr vert="horz" lIns="91440" tIns="45720" rIns="91440" bIns="45720" rtlCol="0" anchor="ctr">
+            <a:normAutofit/>
+          </a:bodyPr>
+          <a:lstStyle/>
+          <a:p>
+            <a:pPr marL="342900" indent="-342900">
+              <a:buFont typeface="Arial" panose="020B0604020202020204" pitchFamily="34" charset="0"/>
+              <a:buChar char="•"/>
+            </a:pPr>
+            <a:r>
+              <a:rPr lang="en-US" dirty="0"/>
+              <a:t>Read video</a:t>
+            </a:r>
+          </a:p>
+          <a:p>
+            <a:pPr marL="342900" indent="-342900">
+              <a:buFont typeface="Arial" panose="020B0604020202020204" pitchFamily="34" charset="0"/>
+              <a:buChar char="•"/>
+            </a:pPr>
+            <a:r>
+              <a:rPr lang="en-US" dirty="0"/>
+              <a:t>Process frame by frame, extract features (1D array)</a:t>
+            </a:r>
+          </a:p>
+          <a:p>
+            <a:pPr marL="342900" indent="-342900">
+              <a:buFont typeface="Arial" panose="020B0604020202020204" pitchFamily="34" charset="0"/>
+              <a:buChar char="•"/>
+            </a:pPr>
+            <a:r>
+              <a:rPr lang="en-US" dirty="0"/>
+              <a:t>Normalize features</a:t>
+            </a:r>
+          </a:p>
+          <a:p>
+            <a:pPr marL="342900" indent="-342900">
+              <a:buFont typeface="Arial" panose="020B0604020202020204" pitchFamily="34" charset="0"/>
+              <a:buChar char="•"/>
+            </a:pPr>
+            <a:r>
+              <a:rPr lang="en-US" dirty="0"/>
+              <a:t>Accumulate for </a:t>
+            </a:r>
+            <a:r>
+              <a:rPr lang="en-US" dirty="0" err="1"/>
+              <a:t>Kmeans</a:t>
+            </a:r>
+            <a:endParaRPr lang="en-US" dirty="0"/>
+          </a:p>
+          <a:p>
+            <a:pPr marL="342900" indent="-342900">
+              <a:buFont typeface="Arial" panose="020B0604020202020204" pitchFamily="34" charset="0"/>
+              <a:buChar char="•"/>
+            </a:pPr>
+            <a:r>
+              <a:rPr lang="en-US" dirty="0"/>
+              <a:t>Find optimal K</a:t>
+            </a:r>
+          </a:p>
+          <a:p>
+            <a:pPr marL="342900" indent="-342900">
+              <a:buFont typeface="Arial" panose="020B0604020202020204" pitchFamily="34" charset="0"/>
+              <a:buChar char="•"/>
+            </a:pPr>
+            <a:r>
+              <a:rPr lang="en-US" dirty="0"/>
+              <a:t>Cluster </a:t>
+            </a:r>
+          </a:p>
+          <a:p>
+            <a:pPr marL="342900" indent="-342900">
+              <a:buFont typeface="Arial" panose="020B0604020202020204" pitchFamily="34" charset="0"/>
+              <a:buChar char="•"/>
+            </a:pPr>
+            <a:r>
+              <a:rPr lang="en-US" dirty="0"/>
+              <a:t>Create highlight (animated GIF)</a:t>
+            </a:r>
+          </a:p>
+          <a:p>
+            <a:pPr marL="342900" indent="-342900">
+              <a:buFont typeface="Arial" panose="020B0604020202020204" pitchFamily="34" charset="0"/>
+              <a:buChar char="•"/>
+            </a:pPr>
+            <a:r>
+              <a:rPr lang="en-US" dirty="0"/>
+              <a:t>Visualization of </a:t>
+            </a:r>
+            <a:r>
+              <a:rPr lang="en-US"/>
+              <a:t>different steps</a:t>
+            </a:r>
+            <a:endParaRPr lang="en-US" dirty="0"/>
+          </a:p>
+        </p:txBody>
+      </p:sp>
     </p:spTree>
     <p:extLst>
       <p:ext uri="{BB962C8B-B14F-4D97-AF65-F5344CB8AC3E}">
-        <p14:creationId xmlns:p14="http://schemas.microsoft.com/office/powerpoint/2010/main" val="1228517852"/>
+        <p14:creationId xmlns:p14="http://schemas.microsoft.com/office/powerpoint/2010/main" val="1202668235"/>
       </p:ext>
     </p:extLst>
   </p:cSld>

</xml_diff>

<commit_message>
Updated on software practices
</commit_message>
<xml_diff>
--- a/Video Clustering using image descriptors.pptx
+++ b/Video Clustering using image descriptors.pptx
@@ -131,7 +131,7 @@
   <pc:docChgLst>
     <pc:chgData name="wajih ullah baig" userId="909666cdfb56e88f" providerId="LiveId" clId="{40840062-6581-4FCE-A77C-8B7FEB783C39}"/>
     <pc:docChg chg="undo custSel addSld delSld modSld sldOrd">
-      <pc:chgData name="wajih ullah baig" userId="909666cdfb56e88f" providerId="LiveId" clId="{40840062-6581-4FCE-A77C-8B7FEB783C39}" dt="2024-07-25T07:28:45.527" v="1640" actId="14100"/>
+      <pc:chgData name="wajih ullah baig" userId="909666cdfb56e88f" providerId="LiveId" clId="{40840062-6581-4FCE-A77C-8B7FEB783C39}" dt="2024-07-25T12:45:22.466" v="1773" actId="20577"/>
       <pc:docMkLst>
         <pc:docMk/>
       </pc:docMkLst>
@@ -491,7 +491,7 @@
         </pc:picChg>
       </pc:sldChg>
       <pc:sldChg chg="modSp add mod setBg">
-        <pc:chgData name="wajih ullah baig" userId="909666cdfb56e88f" providerId="LiveId" clId="{40840062-6581-4FCE-A77C-8B7FEB783C39}" dt="2024-07-24T04:47:51.065" v="685" actId="20577"/>
+        <pc:chgData name="wajih ullah baig" userId="909666cdfb56e88f" providerId="LiveId" clId="{40840062-6581-4FCE-A77C-8B7FEB783C39}" dt="2024-07-25T12:45:22.466" v="1773" actId="20577"/>
         <pc:sldMkLst>
           <pc:docMk/>
           <pc:sldMk cId="2065354616" sldId="320"/>
@@ -505,7 +505,7 @@
           </ac:spMkLst>
         </pc:spChg>
         <pc:spChg chg="mod">
-          <ac:chgData name="wajih ullah baig" userId="909666cdfb56e88f" providerId="LiveId" clId="{40840062-6581-4FCE-A77C-8B7FEB783C39}" dt="2024-07-24T04:47:51.065" v="685" actId="20577"/>
+          <ac:chgData name="wajih ullah baig" userId="909666cdfb56e88f" providerId="LiveId" clId="{40840062-6581-4FCE-A77C-8B7FEB783C39}" dt="2024-07-25T12:45:22.466" v="1773" actId="20577"/>
           <ac:spMkLst>
             <pc:docMk/>
             <pc:sldMk cId="2065354616" sldId="320"/>
@@ -10876,6 +10876,16 @@
             <a:r>
               <a:rPr lang="en-US" dirty="0"/>
               <a:t>Create a GIF animation (Create video highlights)</a:t>
+            </a:r>
+          </a:p>
+          <a:p>
+            <a:pPr marL="342900" indent="-342900">
+              <a:buFont typeface="Arial" panose="020B0604020202020204" pitchFamily="34" charset="0"/>
+              <a:buChar char="•"/>
+            </a:pPr>
+            <a:r>
+              <a:rPr lang="en-US" dirty="0"/>
+              <a:t>A little touch to coding practices</a:t>
             </a:r>
           </a:p>
         </p:txBody>
@@ -12935,25 +12945,6 @@
 </file>
 
 <file path=customXml/item1.xml><?xml version="1.0" encoding="utf-8"?>
-<p:properties xmlns:p="http://schemas.microsoft.com/office/2006/metadata/properties" xmlns:xsi="http://www.w3.org/2001/XMLSchema-instance" xmlns:pc="http://schemas.microsoft.com/office/infopath/2007/PartnerControls">
-  <documentManagement>
-    <Status xmlns="71af3243-3dd4-4a8d-8c0d-dd76da1f02a5">Not started</Status>
-    <_ip_UnifiedCompliancePolicyUIAction xmlns="http://schemas.microsoft.com/sharepoint/v3" xsi:nil="true"/>
-    <Image xmlns="71af3243-3dd4-4a8d-8c0d-dd76da1f02a5">
-      <Url xsi:nil="true"/>
-      <Description xsi:nil="true"/>
-    </Image>
-    <_ip_UnifiedCompliancePolicyProperties xmlns="http://schemas.microsoft.com/sharepoint/v3" xsi:nil="true"/>
-    <ImageTagsTaxHTField xmlns="71af3243-3dd4-4a8d-8c0d-dd76da1f02a5">
-      <Terms xmlns="http://schemas.microsoft.com/office/infopath/2007/PartnerControls"/>
-    </ImageTagsTaxHTField>
-    <TaxCatchAll xmlns="230e9df3-be65-4c73-a93b-d1236ebd677e"/>
-    <MediaServiceKeyPoints xmlns="71af3243-3dd4-4a8d-8c0d-dd76da1f02a5" xsi:nil="true"/>
-  </documentManagement>
-</p:properties>
-</file>
-
-<file path=customXml/item2.xml><?xml version="1.0" encoding="utf-8"?>
 <ct:contentTypeSchema xmlns:ct="http://schemas.microsoft.com/office/2006/metadata/contentType" xmlns:ma="http://schemas.microsoft.com/office/2006/metadata/properties/metaAttributes" ct:_="" ma:_="" ma:contentTypeName="Document" ma:contentTypeID="0x01010079F111ED35F8CC479449609E8A0923A6" ma:contentTypeVersion="20" ma:contentTypeDescription="Create a new document." ma:contentTypeScope="" ma:versionID="1267097ee5f5874adfcc408041ae252e">
   <xsd:schema xmlns:xsd="http://www.w3.org/2001/XMLSchema" xmlns:xs="http://www.w3.org/2001/XMLSchema" xmlns:p="http://schemas.microsoft.com/office/2006/metadata/properties" xmlns:ns1="http://schemas.microsoft.com/sharepoint/v3" xmlns:ns2="71af3243-3dd4-4a8d-8c0d-dd76da1f02a5" xmlns:ns3="16c05727-aa75-4e4a-9b5f-8a80a1165891" xmlns:ns4="230e9df3-be65-4c73-a93b-d1236ebd677e" targetNamespace="http://schemas.microsoft.com/office/2006/metadata/properties" ma:root="true" ma:fieldsID="395891a93df65b14727750f2c06c306c" ns1:_="" ns2:_="" ns3:_="" ns4:_="">
     <xsd:import namespace="http://schemas.microsoft.com/sharepoint/v3"/>
@@ -13229,6 +13220,25 @@
 </ct:contentTypeSchema>
 </file>
 
+<file path=customXml/item2.xml><?xml version="1.0" encoding="utf-8"?>
+<p:properties xmlns:p="http://schemas.microsoft.com/office/2006/metadata/properties" xmlns:xsi="http://www.w3.org/2001/XMLSchema-instance" xmlns:pc="http://schemas.microsoft.com/office/infopath/2007/PartnerControls">
+  <documentManagement>
+    <Status xmlns="71af3243-3dd4-4a8d-8c0d-dd76da1f02a5">Not started</Status>
+    <_ip_UnifiedCompliancePolicyUIAction xmlns="http://schemas.microsoft.com/sharepoint/v3" xsi:nil="true"/>
+    <Image xmlns="71af3243-3dd4-4a8d-8c0d-dd76da1f02a5">
+      <Url xsi:nil="true"/>
+      <Description xsi:nil="true"/>
+    </Image>
+    <_ip_UnifiedCompliancePolicyProperties xmlns="http://schemas.microsoft.com/sharepoint/v3" xsi:nil="true"/>
+    <ImageTagsTaxHTField xmlns="71af3243-3dd4-4a8d-8c0d-dd76da1f02a5">
+      <Terms xmlns="http://schemas.microsoft.com/office/infopath/2007/PartnerControls"/>
+    </ImageTagsTaxHTField>
+    <TaxCatchAll xmlns="230e9df3-be65-4c73-a93b-d1236ebd677e"/>
+    <MediaServiceKeyPoints xmlns="71af3243-3dd4-4a8d-8c0d-dd76da1f02a5" xsi:nil="true"/>
+  </documentManagement>
+</p:properties>
+</file>
+
 <file path=customXml/item3.xml><?xml version="1.0" encoding="utf-8"?>
 <?mso-contentType ?>
 <FormTemplates xmlns="http://schemas.microsoft.com/sharepoint/v3/contenttype/forms">
@@ -13239,18 +13249,6 @@
 </file>
 
 <file path=customXml/itemProps1.xml><?xml version="1.0" encoding="utf-8"?>
-<ds:datastoreItem xmlns:ds="http://schemas.openxmlformats.org/officeDocument/2006/customXml" ds:itemID="{455B3D43-99F7-47DF-90D6-3E3028F5936C}">
-  <ds:schemaRefs>
-    <ds:schemaRef ds:uri="http://schemas.microsoft.com/office/2006/metadata/properties"/>
-    <ds:schemaRef ds:uri="http://schemas.microsoft.com/office/infopath/2007/PartnerControls"/>
-    <ds:schemaRef ds:uri="71af3243-3dd4-4a8d-8c0d-dd76da1f02a5"/>
-    <ds:schemaRef ds:uri="http://schemas.microsoft.com/sharepoint/v3"/>
-    <ds:schemaRef ds:uri="230e9df3-be65-4c73-a93b-d1236ebd677e"/>
-  </ds:schemaRefs>
-</ds:datastoreItem>
-</file>
-
-<file path=customXml/itemProps2.xml><?xml version="1.0" encoding="utf-8"?>
 <ds:datastoreItem xmlns:ds="http://schemas.openxmlformats.org/officeDocument/2006/customXml" ds:itemID="{6B2BE0AF-90CB-4C86-BB1E-26E501BCE9E3}">
   <ds:schemaRefs>
     <ds:schemaRef ds:uri="http://schemas.microsoft.com/office/2006/metadata/contentType"/>
@@ -13271,6 +13269,18 @@
 </ds:datastoreItem>
 </file>
 
+<file path=customXml/itemProps2.xml><?xml version="1.0" encoding="utf-8"?>
+<ds:datastoreItem xmlns:ds="http://schemas.openxmlformats.org/officeDocument/2006/customXml" ds:itemID="{455B3D43-99F7-47DF-90D6-3E3028F5936C}">
+  <ds:schemaRefs>
+    <ds:schemaRef ds:uri="http://schemas.microsoft.com/office/2006/metadata/properties"/>
+    <ds:schemaRef ds:uri="http://schemas.microsoft.com/office/infopath/2007/PartnerControls"/>
+    <ds:schemaRef ds:uri="71af3243-3dd4-4a8d-8c0d-dd76da1f02a5"/>
+    <ds:schemaRef ds:uri="http://schemas.microsoft.com/sharepoint/v3"/>
+    <ds:schemaRef ds:uri="230e9df3-be65-4c73-a93b-d1236ebd677e"/>
+  </ds:schemaRefs>
+</ds:datastoreItem>
+</file>
+
 <file path=customXml/itemProps3.xml><?xml version="1.0" encoding="utf-8"?>
 <ds:datastoreItem xmlns:ds="http://schemas.openxmlformats.org/officeDocument/2006/customXml" ds:itemID="{D0025B34-BD2B-4F65-80AF-217925182ED3}">
   <ds:schemaRefs>

</xml_diff>